<commit_message>
adding adjusted r^2 value
</commit_message>
<xml_diff>
--- a/Project-PPT.pptx
+++ b/Project-PPT.pptx
@@ -297,7 +297,7 @@
           <a:p>
             <a:fld id="{678D3951-72E3-4B8A-BE9F-59D71C16CD19}" type="datetimeFigureOut">
               <a:rPr lang="ko-KR" altLang="en-US" smtClean="0"/>
-              <a:t>2022-12-11</a:t>
+              <a:t>2022-12-14</a:t>
             </a:fld>
             <a:endParaRPr lang="ko-KR" altLang="en-US"/>
           </a:p>
@@ -495,7 +495,7 @@
           <a:p>
             <a:fld id="{678D3951-72E3-4B8A-BE9F-59D71C16CD19}" type="datetimeFigureOut">
               <a:rPr lang="ko-KR" altLang="en-US" smtClean="0"/>
-              <a:t>2022-12-11</a:t>
+              <a:t>2022-12-14</a:t>
             </a:fld>
             <a:endParaRPr lang="ko-KR" altLang="en-US"/>
           </a:p>
@@ -703,7 +703,7 @@
           <a:p>
             <a:fld id="{678D3951-72E3-4B8A-BE9F-59D71C16CD19}" type="datetimeFigureOut">
               <a:rPr lang="ko-KR" altLang="en-US" smtClean="0"/>
-              <a:t>2022-12-11</a:t>
+              <a:t>2022-12-14</a:t>
             </a:fld>
             <a:endParaRPr lang="ko-KR" altLang="en-US"/>
           </a:p>
@@ -901,7 +901,7 @@
           <a:p>
             <a:fld id="{678D3951-72E3-4B8A-BE9F-59D71C16CD19}" type="datetimeFigureOut">
               <a:rPr lang="ko-KR" altLang="en-US" smtClean="0"/>
-              <a:t>2022-12-11</a:t>
+              <a:t>2022-12-14</a:t>
             </a:fld>
             <a:endParaRPr lang="ko-KR" altLang="en-US"/>
           </a:p>
@@ -1176,7 +1176,7 @@
           <a:p>
             <a:fld id="{678D3951-72E3-4B8A-BE9F-59D71C16CD19}" type="datetimeFigureOut">
               <a:rPr lang="ko-KR" altLang="en-US" smtClean="0"/>
-              <a:t>2022-12-11</a:t>
+              <a:t>2022-12-14</a:t>
             </a:fld>
             <a:endParaRPr lang="ko-KR" altLang="en-US"/>
           </a:p>
@@ -1441,7 +1441,7 @@
           <a:p>
             <a:fld id="{678D3951-72E3-4B8A-BE9F-59D71C16CD19}" type="datetimeFigureOut">
               <a:rPr lang="ko-KR" altLang="en-US" smtClean="0"/>
-              <a:t>2022-12-11</a:t>
+              <a:t>2022-12-14</a:t>
             </a:fld>
             <a:endParaRPr lang="ko-KR" altLang="en-US"/>
           </a:p>
@@ -1853,7 +1853,7 @@
           <a:p>
             <a:fld id="{678D3951-72E3-4B8A-BE9F-59D71C16CD19}" type="datetimeFigureOut">
               <a:rPr lang="ko-KR" altLang="en-US" smtClean="0"/>
-              <a:t>2022-12-11</a:t>
+              <a:t>2022-12-14</a:t>
             </a:fld>
             <a:endParaRPr lang="ko-KR" altLang="en-US"/>
           </a:p>
@@ -1994,7 +1994,7 @@
           <a:p>
             <a:fld id="{678D3951-72E3-4B8A-BE9F-59D71C16CD19}" type="datetimeFigureOut">
               <a:rPr lang="ko-KR" altLang="en-US" smtClean="0"/>
-              <a:t>2022-12-11</a:t>
+              <a:t>2022-12-14</a:t>
             </a:fld>
             <a:endParaRPr lang="ko-KR" altLang="en-US"/>
           </a:p>
@@ -2107,7 +2107,7 @@
           <a:p>
             <a:fld id="{678D3951-72E3-4B8A-BE9F-59D71C16CD19}" type="datetimeFigureOut">
               <a:rPr lang="ko-KR" altLang="en-US" smtClean="0"/>
-              <a:t>2022-12-11</a:t>
+              <a:t>2022-12-14</a:t>
             </a:fld>
             <a:endParaRPr lang="ko-KR" altLang="en-US"/>
           </a:p>
@@ -2418,7 +2418,7 @@
           <a:p>
             <a:fld id="{678D3951-72E3-4B8A-BE9F-59D71C16CD19}" type="datetimeFigureOut">
               <a:rPr lang="ko-KR" altLang="en-US" smtClean="0"/>
-              <a:t>2022-12-11</a:t>
+              <a:t>2022-12-14</a:t>
             </a:fld>
             <a:endParaRPr lang="ko-KR" altLang="en-US"/>
           </a:p>
@@ -2706,7 +2706,7 @@
           <a:p>
             <a:fld id="{678D3951-72E3-4B8A-BE9F-59D71C16CD19}" type="datetimeFigureOut">
               <a:rPr lang="ko-KR" altLang="en-US" smtClean="0"/>
-              <a:t>2022-12-11</a:t>
+              <a:t>2022-12-14</a:t>
             </a:fld>
             <a:endParaRPr lang="ko-KR" altLang="en-US"/>
           </a:p>
@@ -2947,7 +2947,7 @@
           <a:p>
             <a:fld id="{678D3951-72E3-4B8A-BE9F-59D71C16CD19}" type="datetimeFigureOut">
               <a:rPr lang="ko-KR" altLang="en-US" smtClean="0"/>
-              <a:t>2022-12-11</a:t>
+              <a:t>2022-12-14</a:t>
             </a:fld>
             <a:endParaRPr lang="ko-KR" altLang="en-US"/>
           </a:p>
@@ -7200,13 +7200,13 @@
               </a:ext>
             </a:extLst>
           </a:blip>
-          <a:srcRect l="21353" t="28163" r="22474" b="15919"/>
+          <a:srcRect l="21353" t="35205" r="26533" b="15919"/>
           <a:stretch/>
         </p:blipFill>
         <p:spPr>
           <a:xfrm>
-            <a:off x="1124869" y="556174"/>
-            <a:ext cx="9521359" cy="5331441"/>
+            <a:off x="1124869" y="1227551"/>
+            <a:ext cx="8833323" cy="4660064"/>
           </a:xfrm>
           <a:prstGeom prst="rect">
             <a:avLst/>

</xml_diff>